<commit_message>
Fixed broken links to repo
</commit_message>
<xml_diff>
--- a/6 AI Project Showcase/Workshop 6.pptx
+++ b/6 AI Project Showcase/Workshop 6.pptx
@@ -120,7 +120,6 @@
 <file path=ppt/revisionInfo.xml><?xml version="1.0" encoding="utf-8"?>
 <p1510:revInfo xmlns:a="http://schemas.openxmlformats.org/drawingml/2006/main" xmlns:r="http://schemas.openxmlformats.org/officeDocument/2006/relationships" xmlns:p1510="http://schemas.microsoft.com/office/powerpoint/2015/10/main">
   <p1510:revLst>
-    <p1510:client id="{1AA39EAC-1BA6-6C4B-AE36-6B5D3D039AB1}" v="35" dt="2025-02-24T10:50:07.701"/>
     <p1510:client id="{F0FDC22C-5D39-F44F-97D4-3941E397C5E0}" v="1" dt="2025-02-24T11:10:32.433"/>
   </p1510:revLst>
 </p1510:revInfo>
@@ -149,14 +148,6 @@
             <ac:spMk id="2" creationId="{8585DA62-143A-7FD7-8C3F-25DABCBEBB06}"/>
           </ac:spMkLst>
         </pc:spChg>
-        <pc:spChg chg="add del mod">
-          <ac:chgData name="Omar Choudhry" userId="7e802f98-9170-4306-b59f-36dfa75ece39" providerId="ADAL" clId="{1AA39EAC-1BA6-6C4B-AE36-6B5D3D039AB1}" dt="2025-02-24T10:18:47.218" v="741" actId="478"/>
-          <ac:spMkLst>
-            <pc:docMk/>
-            <pc:sldMk cId="1339862571" sldId="256"/>
-            <ac:spMk id="5" creationId="{8EB45470-AE2B-DD08-1F65-D54EED8ECA4F}"/>
-          </ac:spMkLst>
-        </pc:spChg>
         <pc:picChg chg="mod">
           <ac:chgData name="Omar Choudhry" userId="7e802f98-9170-4306-b59f-36dfa75ece39" providerId="ADAL" clId="{1AA39EAC-1BA6-6C4B-AE36-6B5D3D039AB1}" dt="2025-02-24T10:18:31.830" v="731"/>
           <ac:picMkLst>
@@ -438,54 +429,6 @@
           <pc:docMk/>
           <pc:sldMk cId="1418128182" sldId="336"/>
         </pc:sldMkLst>
-        <pc:spChg chg="mod">
-          <ac:chgData name="Omar Choudhry" userId="7e802f98-9170-4306-b59f-36dfa75ece39" providerId="ADAL" clId="{1AA39EAC-1BA6-6C4B-AE36-6B5D3D039AB1}" dt="2025-02-24T10:19:21.630" v="757" actId="20577"/>
-          <ac:spMkLst>
-            <pc:docMk/>
-            <pc:sldMk cId="1418128182" sldId="336"/>
-            <ac:spMk id="2" creationId="{0DAAD953-687A-C1BD-37EE-3DAAB705E037}"/>
-          </ac:spMkLst>
-        </pc:spChg>
-        <pc:spChg chg="mod">
-          <ac:chgData name="Omar Choudhry" userId="7e802f98-9170-4306-b59f-36dfa75ece39" providerId="ADAL" clId="{1AA39EAC-1BA6-6C4B-AE36-6B5D3D039AB1}" dt="2025-02-24T10:22:30.910" v="905" actId="403"/>
-          <ac:spMkLst>
-            <pc:docMk/>
-            <pc:sldMk cId="1418128182" sldId="336"/>
-            <ac:spMk id="3" creationId="{0B540B01-2E72-08BE-187F-9DA8A4AD4E21}"/>
-          </ac:spMkLst>
-        </pc:spChg>
-        <pc:picChg chg="add mod">
-          <ac:chgData name="Omar Choudhry" userId="7e802f98-9170-4306-b59f-36dfa75ece39" providerId="ADAL" clId="{1AA39EAC-1BA6-6C4B-AE36-6B5D3D039AB1}" dt="2025-02-24T10:00:14.301" v="28"/>
-          <ac:picMkLst>
-            <pc:docMk/>
-            <pc:sldMk cId="1418128182" sldId="336"/>
-            <ac:picMk id="4" creationId="{4BF49600-9107-6ACD-CFAD-C94B4D20B318}"/>
-          </ac:picMkLst>
-        </pc:picChg>
-        <pc:picChg chg="add mod">
-          <ac:chgData name="Omar Choudhry" userId="7e802f98-9170-4306-b59f-36dfa75ece39" providerId="ADAL" clId="{1AA39EAC-1BA6-6C4B-AE36-6B5D3D039AB1}" dt="2025-02-24T10:00:14.301" v="28"/>
-          <ac:picMkLst>
-            <pc:docMk/>
-            <pc:sldMk cId="1418128182" sldId="336"/>
-            <ac:picMk id="5" creationId="{B7A8C561-048F-C5EA-C319-5BEA5BEA19D0}"/>
-          </ac:picMkLst>
-        </pc:picChg>
-        <pc:picChg chg="add mod">
-          <ac:chgData name="Omar Choudhry" userId="7e802f98-9170-4306-b59f-36dfa75ece39" providerId="ADAL" clId="{1AA39EAC-1BA6-6C4B-AE36-6B5D3D039AB1}" dt="2025-02-24T10:19:23.209" v="759"/>
-          <ac:picMkLst>
-            <pc:docMk/>
-            <pc:sldMk cId="1418128182" sldId="336"/>
-            <ac:picMk id="6" creationId="{3115B184-6CD0-0DE2-DEE6-1B32E0814B2B}"/>
-          </ac:picMkLst>
-        </pc:picChg>
-        <pc:picChg chg="add mod">
-          <ac:chgData name="Omar Choudhry" userId="7e802f98-9170-4306-b59f-36dfa75ece39" providerId="ADAL" clId="{1AA39EAC-1BA6-6C4B-AE36-6B5D3D039AB1}" dt="2025-02-24T10:19:23.209" v="759"/>
-          <ac:picMkLst>
-            <pc:docMk/>
-            <pc:sldMk cId="1418128182" sldId="336"/>
-            <ac:picMk id="7" creationId="{E6AEC972-A643-C447-87BA-585ABB24EFC7}"/>
-          </ac:picMkLst>
-        </pc:picChg>
       </pc:sldChg>
       <pc:sldChg chg="addSp modSp new mod">
         <pc:chgData name="Omar Choudhry" userId="7e802f98-9170-4306-b59f-36dfa75ece39" providerId="ADAL" clId="{1AA39EAC-1BA6-6C4B-AE36-6B5D3D039AB1}" dt="2025-02-24T10:24:07.918" v="918" actId="20577"/>
@@ -493,38 +436,6 @@
           <pc:docMk/>
           <pc:sldMk cId="3542723882" sldId="337"/>
         </pc:sldMkLst>
-        <pc:spChg chg="mod">
-          <ac:chgData name="Omar Choudhry" userId="7e802f98-9170-4306-b59f-36dfa75ece39" providerId="ADAL" clId="{1AA39EAC-1BA6-6C4B-AE36-6B5D3D039AB1}" dt="2025-02-24T10:24:07.918" v="918" actId="20577"/>
-          <ac:spMkLst>
-            <pc:docMk/>
-            <pc:sldMk cId="3542723882" sldId="337"/>
-            <ac:spMk id="2" creationId="{4483DF83-8DCE-6A52-C607-23F480824CF3}"/>
-          </ac:spMkLst>
-        </pc:spChg>
-        <pc:spChg chg="mod">
-          <ac:chgData name="Omar Choudhry" userId="7e802f98-9170-4306-b59f-36dfa75ece39" providerId="ADAL" clId="{1AA39EAC-1BA6-6C4B-AE36-6B5D3D039AB1}" dt="2025-02-24T10:06:08.381" v="341" actId="113"/>
-          <ac:spMkLst>
-            <pc:docMk/>
-            <pc:sldMk cId="3542723882" sldId="337"/>
-            <ac:spMk id="3" creationId="{8FF6FBD6-4C0C-26E3-EB08-06DD063EDBFB}"/>
-          </ac:spMkLst>
-        </pc:spChg>
-        <pc:picChg chg="add mod">
-          <ac:chgData name="Omar Choudhry" userId="7e802f98-9170-4306-b59f-36dfa75ece39" providerId="ADAL" clId="{1AA39EAC-1BA6-6C4B-AE36-6B5D3D039AB1}" dt="2025-02-24T10:18:56.169" v="745" actId="1036"/>
-          <ac:picMkLst>
-            <pc:docMk/>
-            <pc:sldMk cId="3542723882" sldId="337"/>
-            <ac:picMk id="4" creationId="{DCB55E32-EB10-E6AA-23ED-EACB3AE98728}"/>
-          </ac:picMkLst>
-        </pc:picChg>
-        <pc:picChg chg="add mod">
-          <ac:chgData name="Omar Choudhry" userId="7e802f98-9170-4306-b59f-36dfa75ece39" providerId="ADAL" clId="{1AA39EAC-1BA6-6C4B-AE36-6B5D3D039AB1}" dt="2025-02-24T10:18:56.169" v="745" actId="1036"/>
-          <ac:picMkLst>
-            <pc:docMk/>
-            <pc:sldMk cId="3542723882" sldId="337"/>
-            <ac:picMk id="5" creationId="{1973CAAA-BBA6-7EC7-2C24-458A9AB4E45A}"/>
-          </ac:picMkLst>
-        </pc:picChg>
       </pc:sldChg>
       <pc:sldChg chg="addSp modSp new mod">
         <pc:chgData name="Omar Choudhry" userId="7e802f98-9170-4306-b59f-36dfa75ece39" providerId="ADAL" clId="{1AA39EAC-1BA6-6C4B-AE36-6B5D3D039AB1}" dt="2025-02-24T10:30:02.438" v="1136" actId="20577"/>
@@ -532,38 +443,6 @@
           <pc:docMk/>
           <pc:sldMk cId="3763536178" sldId="338"/>
         </pc:sldMkLst>
-        <pc:spChg chg="mod">
-          <ac:chgData name="Omar Choudhry" userId="7e802f98-9170-4306-b59f-36dfa75ece39" providerId="ADAL" clId="{1AA39EAC-1BA6-6C4B-AE36-6B5D3D039AB1}" dt="2025-02-24T10:24:10.369" v="919" actId="20577"/>
-          <ac:spMkLst>
-            <pc:docMk/>
-            <pc:sldMk cId="3763536178" sldId="338"/>
-            <ac:spMk id="2" creationId="{ADC91A5A-02F0-64EF-3657-C295019BDE03}"/>
-          </ac:spMkLst>
-        </pc:spChg>
-        <pc:spChg chg="mod">
-          <ac:chgData name="Omar Choudhry" userId="7e802f98-9170-4306-b59f-36dfa75ece39" providerId="ADAL" clId="{1AA39EAC-1BA6-6C4B-AE36-6B5D3D039AB1}" dt="2025-02-24T10:30:02.438" v="1136" actId="20577"/>
-          <ac:spMkLst>
-            <pc:docMk/>
-            <pc:sldMk cId="3763536178" sldId="338"/>
-            <ac:spMk id="3" creationId="{DC163B1D-39B7-7ED3-9571-BA63CF520E2A}"/>
-          </ac:spMkLst>
-        </pc:spChg>
-        <pc:picChg chg="add mod">
-          <ac:chgData name="Omar Choudhry" userId="7e802f98-9170-4306-b59f-36dfa75ece39" providerId="ADAL" clId="{1AA39EAC-1BA6-6C4B-AE36-6B5D3D039AB1}" dt="2025-02-24T10:19:00.674" v="748" actId="1036"/>
-          <ac:picMkLst>
-            <pc:docMk/>
-            <pc:sldMk cId="3763536178" sldId="338"/>
-            <ac:picMk id="4" creationId="{817B276E-0438-F10A-E206-03359DBA3349}"/>
-          </ac:picMkLst>
-        </pc:picChg>
-        <pc:picChg chg="add mod">
-          <ac:chgData name="Omar Choudhry" userId="7e802f98-9170-4306-b59f-36dfa75ece39" providerId="ADAL" clId="{1AA39EAC-1BA6-6C4B-AE36-6B5D3D039AB1}" dt="2025-02-24T10:19:00.674" v="748" actId="1036"/>
-          <ac:picMkLst>
-            <pc:docMk/>
-            <pc:sldMk cId="3763536178" sldId="338"/>
-            <ac:picMk id="5" creationId="{513C9423-95C4-E0BC-4777-16D94A14C486}"/>
-          </ac:picMkLst>
-        </pc:picChg>
       </pc:sldChg>
       <pc:sldChg chg="addSp modSp new mod">
         <pc:chgData name="Omar Choudhry" userId="7e802f98-9170-4306-b59f-36dfa75ece39" providerId="ADAL" clId="{1AA39EAC-1BA6-6C4B-AE36-6B5D3D039AB1}" dt="2025-02-24T10:24:12.282" v="920" actId="20577"/>
@@ -571,38 +450,6 @@
           <pc:docMk/>
           <pc:sldMk cId="1618206010" sldId="339"/>
         </pc:sldMkLst>
-        <pc:spChg chg="mod">
-          <ac:chgData name="Omar Choudhry" userId="7e802f98-9170-4306-b59f-36dfa75ece39" providerId="ADAL" clId="{1AA39EAC-1BA6-6C4B-AE36-6B5D3D039AB1}" dt="2025-02-24T10:24:12.282" v="920" actId="20577"/>
-          <ac:spMkLst>
-            <pc:docMk/>
-            <pc:sldMk cId="1618206010" sldId="339"/>
-            <ac:spMk id="2" creationId="{B43C42B2-F2FC-344E-0BF8-3F0B19AC2E06}"/>
-          </ac:spMkLst>
-        </pc:spChg>
-        <pc:spChg chg="mod">
-          <ac:chgData name="Omar Choudhry" userId="7e802f98-9170-4306-b59f-36dfa75ece39" providerId="ADAL" clId="{1AA39EAC-1BA6-6C4B-AE36-6B5D3D039AB1}" dt="2025-02-24T10:09:19.776" v="529" actId="20577"/>
-          <ac:spMkLst>
-            <pc:docMk/>
-            <pc:sldMk cId="1618206010" sldId="339"/>
-            <ac:spMk id="3" creationId="{24AC454E-0A30-9206-BE9A-ABC57AC5FF66}"/>
-          </ac:spMkLst>
-        </pc:spChg>
-        <pc:picChg chg="add mod">
-          <ac:chgData name="Omar Choudhry" userId="7e802f98-9170-4306-b59f-36dfa75ece39" providerId="ADAL" clId="{1AA39EAC-1BA6-6C4B-AE36-6B5D3D039AB1}" dt="2025-02-24T10:19:01.766" v="749"/>
-          <ac:picMkLst>
-            <pc:docMk/>
-            <pc:sldMk cId="1618206010" sldId="339"/>
-            <ac:picMk id="4" creationId="{624EAE6D-3C3B-6F7C-B132-C66723C44D37}"/>
-          </ac:picMkLst>
-        </pc:picChg>
-        <pc:picChg chg="add mod">
-          <ac:chgData name="Omar Choudhry" userId="7e802f98-9170-4306-b59f-36dfa75ece39" providerId="ADAL" clId="{1AA39EAC-1BA6-6C4B-AE36-6B5D3D039AB1}" dt="2025-02-24T10:19:01.766" v="749"/>
-          <ac:picMkLst>
-            <pc:docMk/>
-            <pc:sldMk cId="1618206010" sldId="339"/>
-            <ac:picMk id="5" creationId="{57A2D0FB-6E63-300A-E24D-3AAF4CAD312B}"/>
-          </ac:picMkLst>
-        </pc:picChg>
       </pc:sldChg>
       <pc:sldChg chg="addSp modSp new mod">
         <pc:chgData name="Omar Choudhry" userId="7e802f98-9170-4306-b59f-36dfa75ece39" providerId="ADAL" clId="{1AA39EAC-1BA6-6C4B-AE36-6B5D3D039AB1}" dt="2025-02-24T11:05:30.237" v="1514" actId="20577"/>
@@ -610,38 +457,6 @@
           <pc:docMk/>
           <pc:sldMk cId="2534609961" sldId="340"/>
         </pc:sldMkLst>
-        <pc:spChg chg="mod">
-          <ac:chgData name="Omar Choudhry" userId="7e802f98-9170-4306-b59f-36dfa75ece39" providerId="ADAL" clId="{1AA39EAC-1BA6-6C4B-AE36-6B5D3D039AB1}" dt="2025-02-24T10:24:14.122" v="921" actId="20577"/>
-          <ac:spMkLst>
-            <pc:docMk/>
-            <pc:sldMk cId="2534609961" sldId="340"/>
-            <ac:spMk id="2" creationId="{EF184091-483F-9757-E68D-5D0E120DFD45}"/>
-          </ac:spMkLst>
-        </pc:spChg>
-        <pc:spChg chg="mod">
-          <ac:chgData name="Omar Choudhry" userId="7e802f98-9170-4306-b59f-36dfa75ece39" providerId="ADAL" clId="{1AA39EAC-1BA6-6C4B-AE36-6B5D3D039AB1}" dt="2025-02-24T11:05:30.237" v="1514" actId="20577"/>
-          <ac:spMkLst>
-            <pc:docMk/>
-            <pc:sldMk cId="2534609961" sldId="340"/>
-            <ac:spMk id="3" creationId="{0DA3F2BD-CC22-4B9D-D9EF-FDA25D017256}"/>
-          </ac:spMkLst>
-        </pc:spChg>
-        <pc:picChg chg="add mod">
-          <ac:chgData name="Omar Choudhry" userId="7e802f98-9170-4306-b59f-36dfa75ece39" providerId="ADAL" clId="{1AA39EAC-1BA6-6C4B-AE36-6B5D3D039AB1}" dt="2025-02-24T10:19:02.958" v="750"/>
-          <ac:picMkLst>
-            <pc:docMk/>
-            <pc:sldMk cId="2534609961" sldId="340"/>
-            <ac:picMk id="4" creationId="{0C13548C-E259-7E04-F1CE-5EEF8A9C732D}"/>
-          </ac:picMkLst>
-        </pc:picChg>
-        <pc:picChg chg="add mod">
-          <ac:chgData name="Omar Choudhry" userId="7e802f98-9170-4306-b59f-36dfa75ece39" providerId="ADAL" clId="{1AA39EAC-1BA6-6C4B-AE36-6B5D3D039AB1}" dt="2025-02-24T10:19:02.958" v="750"/>
-          <ac:picMkLst>
-            <pc:docMk/>
-            <pc:sldMk cId="2534609961" sldId="340"/>
-            <ac:picMk id="5" creationId="{5FA2A740-6753-4C66-E6E7-BF7A53AD6EF9}"/>
-          </ac:picMkLst>
-        </pc:picChg>
       </pc:sldChg>
       <pc:sldChg chg="add">
         <pc:chgData name="Omar Choudhry" userId="7e802f98-9170-4306-b59f-36dfa75ece39" providerId="ADAL" clId="{1AA39EAC-1BA6-6C4B-AE36-6B5D3D039AB1}" dt="2025-02-24T10:18:49.766" v="742"/>
@@ -656,22 +471,6 @@
           <pc:docMk/>
           <pc:sldMk cId="2738281542" sldId="342"/>
         </pc:sldMkLst>
-        <pc:spChg chg="mod">
-          <ac:chgData name="Omar Choudhry" userId="7e802f98-9170-4306-b59f-36dfa75ece39" providerId="ADAL" clId="{1AA39EAC-1BA6-6C4B-AE36-6B5D3D039AB1}" dt="2025-02-24T10:24:16.040" v="922" actId="20577"/>
-          <ac:spMkLst>
-            <pc:docMk/>
-            <pc:sldMk cId="2738281542" sldId="342"/>
-            <ac:spMk id="2" creationId="{F8CE0EF3-6A40-8A26-1639-C79733B8C068}"/>
-          </ac:spMkLst>
-        </pc:spChg>
-        <pc:spChg chg="mod">
-          <ac:chgData name="Omar Choudhry" userId="7e802f98-9170-4306-b59f-36dfa75ece39" providerId="ADAL" clId="{1AA39EAC-1BA6-6C4B-AE36-6B5D3D039AB1}" dt="2025-02-24T10:29:16.253" v="1067" actId="20577"/>
-          <ac:spMkLst>
-            <pc:docMk/>
-            <pc:sldMk cId="2738281542" sldId="342"/>
-            <ac:spMk id="3" creationId="{CE116790-4665-B6F1-DD9F-931B67D9D363}"/>
-          </ac:spMkLst>
-        </pc:spChg>
       </pc:sldChg>
       <pc:sldChg chg="addSp delSp modSp add mod">
         <pc:chgData name="Omar Choudhry" userId="7e802f98-9170-4306-b59f-36dfa75ece39" providerId="ADAL" clId="{1AA39EAC-1BA6-6C4B-AE36-6B5D3D039AB1}" dt="2025-02-24T10:31:47.893" v="1153" actId="1076"/>
@@ -679,38 +478,6 @@
           <pc:docMk/>
           <pc:sldMk cId="1235786244" sldId="343"/>
         </pc:sldMkLst>
-        <pc:spChg chg="del">
-          <ac:chgData name="Omar Choudhry" userId="7e802f98-9170-4306-b59f-36dfa75ece39" providerId="ADAL" clId="{1AA39EAC-1BA6-6C4B-AE36-6B5D3D039AB1}" dt="2025-02-24T10:31:20.567" v="1138" actId="478"/>
-          <ac:spMkLst>
-            <pc:docMk/>
-            <pc:sldMk cId="1235786244" sldId="343"/>
-            <ac:spMk id="3" creationId="{3A65E1DC-A6D1-2E47-908E-B0D0847455EA}"/>
-          </ac:spMkLst>
-        </pc:spChg>
-        <pc:spChg chg="add del mod">
-          <ac:chgData name="Omar Choudhry" userId="7e802f98-9170-4306-b59f-36dfa75ece39" providerId="ADAL" clId="{1AA39EAC-1BA6-6C4B-AE36-6B5D3D039AB1}" dt="2025-02-24T10:31:22.012" v="1139" actId="478"/>
-          <ac:spMkLst>
-            <pc:docMk/>
-            <pc:sldMk cId="1235786244" sldId="343"/>
-            <ac:spMk id="7" creationId="{57E9739F-3F4E-EDF2-979D-044577721792}"/>
-          </ac:spMkLst>
-        </pc:spChg>
-        <pc:spChg chg="add mod">
-          <ac:chgData name="Omar Choudhry" userId="7e802f98-9170-4306-b59f-36dfa75ece39" providerId="ADAL" clId="{1AA39EAC-1BA6-6C4B-AE36-6B5D3D039AB1}" dt="2025-02-24T10:31:47.893" v="1153" actId="1076"/>
-          <ac:spMkLst>
-            <pc:docMk/>
-            <pc:sldMk cId="1235786244" sldId="343"/>
-            <ac:spMk id="8" creationId="{C3884258-976B-0F8B-332E-9064E8DDD713}"/>
-          </ac:spMkLst>
-        </pc:spChg>
-        <pc:picChg chg="add mod">
-          <ac:chgData name="Omar Choudhry" userId="7e802f98-9170-4306-b59f-36dfa75ece39" providerId="ADAL" clId="{1AA39EAC-1BA6-6C4B-AE36-6B5D3D039AB1}" dt="2025-02-24T10:31:30.165" v="1144" actId="1076"/>
-          <ac:picMkLst>
-            <pc:docMk/>
-            <pc:sldMk cId="1235786244" sldId="343"/>
-            <ac:picMk id="1026" creationId="{CEAE1BBC-8BB3-90A7-BF0B-13E21B9D8C82}"/>
-          </ac:picMkLst>
-        </pc:picChg>
       </pc:sldChg>
       <pc:sldChg chg="addSp delSp modSp add mod">
         <pc:chgData name="Omar Choudhry" userId="7e802f98-9170-4306-b59f-36dfa75ece39" providerId="ADAL" clId="{1AA39EAC-1BA6-6C4B-AE36-6B5D3D039AB1}" dt="2025-02-24T10:52:15.059" v="1172" actId="1076"/>
@@ -718,30 +485,6 @@
           <pc:docMk/>
           <pc:sldMk cId="2454525919" sldId="344"/>
         </pc:sldMkLst>
-        <pc:spChg chg="mod">
-          <ac:chgData name="Omar Choudhry" userId="7e802f98-9170-4306-b59f-36dfa75ece39" providerId="ADAL" clId="{1AA39EAC-1BA6-6C4B-AE36-6B5D3D039AB1}" dt="2025-02-24T10:52:15.059" v="1172" actId="1076"/>
-          <ac:spMkLst>
-            <pc:docMk/>
-            <pc:sldMk cId="2454525919" sldId="344"/>
-            <ac:spMk id="8" creationId="{000F53E0-3C0B-6C9D-17FE-4CB4E891D77E}"/>
-          </ac:spMkLst>
-        </pc:spChg>
-        <pc:picChg chg="del">
-          <ac:chgData name="Omar Choudhry" userId="7e802f98-9170-4306-b59f-36dfa75ece39" providerId="ADAL" clId="{1AA39EAC-1BA6-6C4B-AE36-6B5D3D039AB1}" dt="2025-02-24T10:48:53.691" v="1155" actId="478"/>
-          <ac:picMkLst>
-            <pc:docMk/>
-            <pc:sldMk cId="2454525919" sldId="344"/>
-            <ac:picMk id="1026" creationId="{505538A1-7A31-5F13-CA2E-3C3106C32D83}"/>
-          </ac:picMkLst>
-        </pc:picChg>
-        <pc:picChg chg="add mod">
-          <ac:chgData name="Omar Choudhry" userId="7e802f98-9170-4306-b59f-36dfa75ece39" providerId="ADAL" clId="{1AA39EAC-1BA6-6C4B-AE36-6B5D3D039AB1}" dt="2025-02-24T10:50:07.701" v="1160" actId="1076"/>
-          <ac:picMkLst>
-            <pc:docMk/>
-            <pc:sldMk cId="2454525919" sldId="344"/>
-            <ac:picMk id="3074" creationId="{7326D619-431F-F617-E31C-B0057AB08A2E}"/>
-          </ac:picMkLst>
-        </pc:picChg>
       </pc:sldChg>
       <pc:sldChg chg="modSp add mod">
         <pc:chgData name="Omar Choudhry" userId="7e802f98-9170-4306-b59f-36dfa75ece39" providerId="ADAL" clId="{1AA39EAC-1BA6-6C4B-AE36-6B5D3D039AB1}" dt="2025-02-24T10:56:27.890" v="1183" actId="20577"/>
@@ -1363,7 +1106,7 @@
   <pc:docChgLst>
     <pc:chgData name="Omar Choudhry" userId="7e802f98-9170-4306-b59f-36dfa75ece39" providerId="ADAL" clId="{F0FDC22C-5D39-F44F-97D4-3941E397C5E0}"/>
     <pc:docChg chg="delSld modSld">
-      <pc:chgData name="Omar Choudhry" userId="7e802f98-9170-4306-b59f-36dfa75ece39" providerId="ADAL" clId="{F0FDC22C-5D39-F44F-97D4-3941E397C5E0}" dt="2025-02-24T11:10:50.192" v="45" actId="2696"/>
+      <pc:chgData name="Omar Choudhry" userId="7e802f98-9170-4306-b59f-36dfa75ece39" providerId="ADAL" clId="{F0FDC22C-5D39-F44F-97D4-3941E397C5E0}" dt="2025-02-27T09:48:42.686" v="46"/>
       <pc:docMkLst>
         <pc:docMk/>
       </pc:docMkLst>
@@ -1389,6 +1132,21 @@
             <ac:picMk id="17" creationId="{4900FFCA-5684-73F8-AD25-55DF66C34FE7}"/>
           </ac:picMkLst>
         </pc:picChg>
+      </pc:sldChg>
+      <pc:sldChg chg="modSp mod">
+        <pc:chgData name="Omar Choudhry" userId="7e802f98-9170-4306-b59f-36dfa75ece39" providerId="ADAL" clId="{F0FDC22C-5D39-F44F-97D4-3941E397C5E0}" dt="2025-02-27T09:48:42.686" v="46"/>
+        <pc:sldMkLst>
+          <pc:docMk/>
+          <pc:sldMk cId="1312462714" sldId="274"/>
+        </pc:sldMkLst>
+        <pc:spChg chg="mod">
+          <ac:chgData name="Omar Choudhry" userId="7e802f98-9170-4306-b59f-36dfa75ece39" providerId="ADAL" clId="{F0FDC22C-5D39-F44F-97D4-3941E397C5E0}" dt="2025-02-27T09:48:42.686" v="46"/>
+          <ac:spMkLst>
+            <pc:docMk/>
+            <pc:sldMk cId="1312462714" sldId="274"/>
+            <ac:spMk id="9" creationId="{9FFEED51-C5F6-73DB-3318-53E45C709F25}"/>
+          </ac:spMkLst>
+        </pc:spChg>
       </pc:sldChg>
       <pc:sldChg chg="del">
         <pc:chgData name="Omar Choudhry" userId="7e802f98-9170-4306-b59f-36dfa75ece39" providerId="ADAL" clId="{F0FDC22C-5D39-F44F-97D4-3941E397C5E0}" dt="2025-02-24T11:10:44.466" v="37" actId="2696"/>
@@ -1540,7 +1298,7 @@
           <a:p>
             <a:fld id="{D6C5CE0B-9EB1-714B-9DAB-8A72ADC53746}" type="datetimeFigureOut">
               <a:rPr lang="en-GB" smtClean="0"/>
-              <a:t>24/02/2025</a:t>
+              <a:t>27/02/2025</a:t>
             </a:fld>
             <a:endParaRPr lang="en-GB"/>
           </a:p>
@@ -2173,7 +1931,7 @@
           <a:p>
             <a:fld id="{4CDE23C7-78A4-413A-A84B-93D4CC0A9EB1}" type="datetimeFigureOut">
               <a:rPr lang="en-US" smtClean="0"/>
-              <a:t>2/24/25</a:t>
+              <a:t>2/27/25</a:t>
             </a:fld>
             <a:endParaRPr lang="en-US"/>
           </a:p>
@@ -2376,7 +2134,7 @@
           <a:p>
             <a:fld id="{4CDE23C7-78A4-413A-A84B-93D4CC0A9EB1}" type="datetimeFigureOut">
               <a:rPr lang="en-US" smtClean="0"/>
-              <a:t>2/24/25</a:t>
+              <a:t>2/27/25</a:t>
             </a:fld>
             <a:endParaRPr lang="en-US"/>
           </a:p>
@@ -2584,7 +2342,7 @@
           <a:p>
             <a:fld id="{4CDE23C7-78A4-413A-A84B-93D4CC0A9EB1}" type="datetimeFigureOut">
               <a:rPr lang="en-US" smtClean="0"/>
-              <a:t>2/24/25</a:t>
+              <a:t>2/27/25</a:t>
             </a:fld>
             <a:endParaRPr lang="en-US"/>
           </a:p>
@@ -2782,7 +2540,7 @@
           <a:p>
             <a:fld id="{4CDE23C7-78A4-413A-A84B-93D4CC0A9EB1}" type="datetimeFigureOut">
               <a:rPr lang="en-US" smtClean="0"/>
-              <a:t>2/24/25</a:t>
+              <a:t>2/27/25</a:t>
             </a:fld>
             <a:endParaRPr lang="en-US"/>
           </a:p>
@@ -3059,7 +2817,7 @@
           <a:p>
             <a:fld id="{4CDE23C7-78A4-413A-A84B-93D4CC0A9EB1}" type="datetimeFigureOut">
               <a:rPr lang="en-US" smtClean="0"/>
-              <a:t>2/24/25</a:t>
+              <a:t>2/27/25</a:t>
             </a:fld>
             <a:endParaRPr lang="en-US"/>
           </a:p>
@@ -3324,7 +3082,7 @@
           <a:p>
             <a:fld id="{4CDE23C7-78A4-413A-A84B-93D4CC0A9EB1}" type="datetimeFigureOut">
               <a:rPr lang="en-US" smtClean="0"/>
-              <a:t>2/24/25</a:t>
+              <a:t>2/27/25</a:t>
             </a:fld>
             <a:endParaRPr lang="en-US"/>
           </a:p>
@@ -3740,7 +3498,7 @@
           <a:p>
             <a:fld id="{4CDE23C7-78A4-413A-A84B-93D4CC0A9EB1}" type="datetimeFigureOut">
               <a:rPr lang="en-US" smtClean="0"/>
-              <a:t>2/24/25</a:t>
+              <a:t>2/27/25</a:t>
             </a:fld>
             <a:endParaRPr lang="en-US"/>
           </a:p>
@@ -3881,7 +3639,7 @@
           <a:p>
             <a:fld id="{4CDE23C7-78A4-413A-A84B-93D4CC0A9EB1}" type="datetimeFigureOut">
               <a:rPr lang="en-US" smtClean="0"/>
-              <a:t>2/24/25</a:t>
+              <a:t>2/27/25</a:t>
             </a:fld>
             <a:endParaRPr lang="en-US"/>
           </a:p>
@@ -3994,7 +3752,7 @@
           <a:p>
             <a:fld id="{4CDE23C7-78A4-413A-A84B-93D4CC0A9EB1}" type="datetimeFigureOut">
               <a:rPr lang="en-US" smtClean="0"/>
-              <a:t>2/24/25</a:t>
+              <a:t>2/27/25</a:t>
             </a:fld>
             <a:endParaRPr lang="en-US"/>
           </a:p>
@@ -4305,7 +4063,7 @@
           <a:p>
             <a:fld id="{4CDE23C7-78A4-413A-A84B-93D4CC0A9EB1}" type="datetimeFigureOut">
               <a:rPr lang="en-US" smtClean="0"/>
-              <a:t>2/24/25</a:t>
+              <a:t>2/27/25</a:t>
             </a:fld>
             <a:endParaRPr lang="en-US"/>
           </a:p>
@@ -4593,7 +4351,7 @@
           <a:p>
             <a:fld id="{4CDE23C7-78A4-413A-A84B-93D4CC0A9EB1}" type="datetimeFigureOut">
               <a:rPr lang="en-US" smtClean="0"/>
-              <a:t>2/24/25</a:t>
+              <a:t>2/27/25</a:t>
             </a:fld>
             <a:endParaRPr lang="en-US"/>
           </a:p>
@@ -4833,7 +4591,7 @@
             <a:fld id="{4CDE23C7-78A4-413A-A84B-93D4CC0A9EB1}" type="datetimeFigureOut">
               <a:rPr lang="en-US" smtClean="0"/>
               <a:pPr/>
-              <a:t>2/24/25</a:t>
+              <a:t>2/27/25</a:t>
             </a:fld>
             <a:endParaRPr lang="en-US" dirty="0"/>
           </a:p>
@@ -6249,7 +6007,7 @@
         <p:spPr>
           <a:xfrm>
             <a:off x="548633" y="1844158"/>
-            <a:ext cx="6019597" cy="369332"/>
+            <a:ext cx="6378669" cy="369332"/>
           </a:xfrm>
           <a:prstGeom prst="rect">
             <a:avLst/>
@@ -6279,7 +6037,22 @@
                   </a:extLst>
                 </a:hlinkClick>
               </a:rPr>
-              <a:t>github.com/omariosc/ai-workshops</a:t>
+              <a:t>github.com/omariosc/aisoc</a:t>
+            </a:r>
+            <a:r>
+              <a:rPr lang="en-GB">
+                <a:solidFill>
+                  <a:srgbClr val="00B0F0"/>
+                </a:solidFill>
+                <a:hlinkClick r:id="rId4">
+                  <a:extLst>
+                    <a:ext uri="{A12FA001-AC4F-418D-AE19-62706E023703}">
+                      <ahyp:hlinkClr xmlns:ahyp="http://schemas.microsoft.com/office/drawing/2018/hyperlinkcolor" val="tx"/>
+                    </a:ext>
+                  </a:extLst>
+                </a:hlinkClick>
+              </a:rPr>
+              <a:t>-workshops</a:t>
             </a:r>
             <a:endParaRPr lang="en-GB" dirty="0">
               <a:solidFill>

</xml_diff>